<commit_message>
updated configuration files for testing
</commit_message>
<xml_diff>
--- a/Assets/StreamingAssets/2D_Objects/Contingencies/~Contigency Instructions.pptx
+++ b/Assets/StreamingAssets/2D_Objects/Contingencies/~Contigency Instructions.pptx
@@ -13,6 +13,8 @@
     <p:sldId id="293" r:id="rId7"/>
     <p:sldId id="294" r:id="rId8"/>
     <p:sldId id="295" r:id="rId9"/>
+    <p:sldId id="297" r:id="rId10"/>
+    <p:sldId id="296" r:id="rId11"/>
   </p:sldIdLst>
   <p:sldSz cx="12192000" cy="6858000"/>
   <p:notesSz cx="6858000" cy="9144000"/>
@@ -266,7 +268,7 @@
           <a:p>
             <a:fld id="{43D9F887-C526-42E2-BE1C-7F1C55940A26}" type="datetimeFigureOut">
               <a:rPr lang="en-US" smtClean="0"/>
-              <a:t>8/25/2020</a:t>
+              <a:t>8/29/2020</a:t>
             </a:fld>
             <a:endParaRPr lang="en-US"/>
           </a:p>
@@ -464,7 +466,7 @@
           <a:p>
             <a:fld id="{43D9F887-C526-42E2-BE1C-7F1C55940A26}" type="datetimeFigureOut">
               <a:rPr lang="en-US" smtClean="0"/>
-              <a:t>8/25/2020</a:t>
+              <a:t>8/29/2020</a:t>
             </a:fld>
             <a:endParaRPr lang="en-US"/>
           </a:p>
@@ -672,7 +674,7 @@
           <a:p>
             <a:fld id="{43D9F887-C526-42E2-BE1C-7F1C55940A26}" type="datetimeFigureOut">
               <a:rPr lang="en-US" smtClean="0"/>
-              <a:t>8/25/2020</a:t>
+              <a:t>8/29/2020</a:t>
             </a:fld>
             <a:endParaRPr lang="en-US"/>
           </a:p>
@@ -870,7 +872,7 @@
           <a:p>
             <a:fld id="{43D9F887-C526-42E2-BE1C-7F1C55940A26}" type="datetimeFigureOut">
               <a:rPr lang="en-US" smtClean="0"/>
-              <a:t>8/25/2020</a:t>
+              <a:t>8/29/2020</a:t>
             </a:fld>
             <a:endParaRPr lang="en-US"/>
           </a:p>
@@ -1145,7 +1147,7 @@
           <a:p>
             <a:fld id="{43D9F887-C526-42E2-BE1C-7F1C55940A26}" type="datetimeFigureOut">
               <a:rPr lang="en-US" smtClean="0"/>
-              <a:t>8/25/2020</a:t>
+              <a:t>8/29/2020</a:t>
             </a:fld>
             <a:endParaRPr lang="en-US"/>
           </a:p>
@@ -1410,7 +1412,7 @@
           <a:p>
             <a:fld id="{43D9F887-C526-42E2-BE1C-7F1C55940A26}" type="datetimeFigureOut">
               <a:rPr lang="en-US" smtClean="0"/>
-              <a:t>8/25/2020</a:t>
+              <a:t>8/29/2020</a:t>
             </a:fld>
             <a:endParaRPr lang="en-US"/>
           </a:p>
@@ -1822,7 +1824,7 @@
           <a:p>
             <a:fld id="{43D9F887-C526-42E2-BE1C-7F1C55940A26}" type="datetimeFigureOut">
               <a:rPr lang="en-US" smtClean="0"/>
-              <a:t>8/25/2020</a:t>
+              <a:t>8/29/2020</a:t>
             </a:fld>
             <a:endParaRPr lang="en-US"/>
           </a:p>
@@ -1963,7 +1965,7 @@
           <a:p>
             <a:fld id="{43D9F887-C526-42E2-BE1C-7F1C55940A26}" type="datetimeFigureOut">
               <a:rPr lang="en-US" smtClean="0"/>
-              <a:t>8/25/2020</a:t>
+              <a:t>8/29/2020</a:t>
             </a:fld>
             <a:endParaRPr lang="en-US"/>
           </a:p>
@@ -2076,7 +2078,7 @@
           <a:p>
             <a:fld id="{43D9F887-C526-42E2-BE1C-7F1C55940A26}" type="datetimeFigureOut">
               <a:rPr lang="en-US" smtClean="0"/>
-              <a:t>8/25/2020</a:t>
+              <a:t>8/29/2020</a:t>
             </a:fld>
             <a:endParaRPr lang="en-US"/>
           </a:p>
@@ -2387,7 +2389,7 @@
           <a:p>
             <a:fld id="{43D9F887-C526-42E2-BE1C-7F1C55940A26}" type="datetimeFigureOut">
               <a:rPr lang="en-US" smtClean="0"/>
-              <a:t>8/25/2020</a:t>
+              <a:t>8/29/2020</a:t>
             </a:fld>
             <a:endParaRPr lang="en-US"/>
           </a:p>
@@ -2675,7 +2677,7 @@
           <a:p>
             <a:fld id="{43D9F887-C526-42E2-BE1C-7F1C55940A26}" type="datetimeFigureOut">
               <a:rPr lang="en-US" smtClean="0"/>
-              <a:t>8/25/2020</a:t>
+              <a:t>8/29/2020</a:t>
             </a:fld>
             <a:endParaRPr lang="en-US"/>
           </a:p>
@@ -2916,7 +2918,7 @@
           <a:p>
             <a:fld id="{43D9F887-C526-42E2-BE1C-7F1C55940A26}" type="datetimeFigureOut">
               <a:rPr lang="en-US" smtClean="0"/>
-              <a:t>8/25/2020</a:t>
+              <a:t>8/29/2020</a:t>
             </a:fld>
             <a:endParaRPr lang="en-US"/>
           </a:p>
@@ -3478,6 +3480,86 @@
 </p:sld>
 </file>
 
+<file path=ppt/slides/slide10.xml><?xml version="1.0" encoding="utf-8"?>
+<p:sld xmlns:a="http://schemas.openxmlformats.org/drawingml/2006/main" xmlns:r="http://schemas.openxmlformats.org/officeDocument/2006/relationships" xmlns:p="http://schemas.openxmlformats.org/presentationml/2006/main">
+  <p:cSld>
+    <p:spTree>
+      <p:nvGrpSpPr>
+        <p:cNvPr id="1" name=""/>
+        <p:cNvGrpSpPr/>
+        <p:nvPr/>
+      </p:nvGrpSpPr>
+      <p:grpSpPr>
+        <a:xfrm>
+          <a:off x="0" y="0"/>
+          <a:ext cx="0" cy="0"/>
+          <a:chOff x="0" y="0"/>
+          <a:chExt cx="0" cy="0"/>
+        </a:xfrm>
+      </p:grpSpPr>
+      <p:sp>
+        <p:nvSpPr>
+          <p:cNvPr id="2" name="Title 1">
+            <a:extLst>
+              <a:ext uri="{FF2B5EF4-FFF2-40B4-BE49-F238E27FC236}">
+                <a16:creationId xmlns:a16="http://schemas.microsoft.com/office/drawing/2014/main" id="{58C0A947-BA7E-41FF-9C79-321BC2E8E401}"/>
+              </a:ext>
+            </a:extLst>
+          </p:cNvPr>
+          <p:cNvSpPr>
+            <a:spLocks noGrp="1"/>
+          </p:cNvSpPr>
+          <p:nvPr>
+            <p:ph type="title"/>
+          </p:nvPr>
+        </p:nvSpPr>
+        <p:spPr/>
+        <p:txBody>
+          <a:bodyPr/>
+          <a:lstStyle/>
+          <a:p>
+            <a:endParaRPr lang="en-US"/>
+          </a:p>
+        </p:txBody>
+      </p:sp>
+      <p:sp>
+        <p:nvSpPr>
+          <p:cNvPr id="3" name="Content Placeholder 2">
+            <a:extLst>
+              <a:ext uri="{FF2B5EF4-FFF2-40B4-BE49-F238E27FC236}">
+                <a16:creationId xmlns:a16="http://schemas.microsoft.com/office/drawing/2014/main" id="{2A5DFA4A-9AE0-4497-85E6-DD95F589A535}"/>
+              </a:ext>
+            </a:extLst>
+          </p:cNvPr>
+          <p:cNvSpPr>
+            <a:spLocks noGrp="1"/>
+          </p:cNvSpPr>
+          <p:nvPr>
+            <p:ph idx="1"/>
+          </p:nvPr>
+        </p:nvSpPr>
+        <p:spPr/>
+        <p:txBody>
+          <a:bodyPr/>
+          <a:lstStyle/>
+          <a:p>
+            <a:endParaRPr lang="en-US"/>
+          </a:p>
+        </p:txBody>
+      </p:sp>
+    </p:spTree>
+    <p:extLst>
+      <p:ext uri="{BB962C8B-B14F-4D97-AF65-F5344CB8AC3E}">
+        <p14:creationId xmlns:p14="http://schemas.microsoft.com/office/powerpoint/2010/main" val="2412305061"/>
+      </p:ext>
+    </p:extLst>
+  </p:cSld>
+  <p:clrMapOvr>
+    <a:masterClrMapping/>
+  </p:clrMapOvr>
+</p:sld>
+</file>
+
 <file path=ppt/slides/slide2.xml><?xml version="1.0" encoding="utf-8"?>
 <p:sld xmlns:a="http://schemas.openxmlformats.org/drawingml/2006/main" xmlns:r="http://schemas.openxmlformats.org/officeDocument/2006/relationships" xmlns:p="http://schemas.openxmlformats.org/presentationml/2006/main">
   <p:cSld>
@@ -4493,6 +4575,77 @@
     <p:extLst>
       <p:ext uri="{BB962C8B-B14F-4D97-AF65-F5344CB8AC3E}">
         <p14:creationId xmlns:p14="http://schemas.microsoft.com/office/powerpoint/2010/main" val="672547950"/>
+      </p:ext>
+    </p:extLst>
+  </p:cSld>
+  <p:clrMapOvr>
+    <a:masterClrMapping/>
+  </p:clrMapOvr>
+</p:sld>
+</file>
+
+<file path=ppt/slides/slide9.xml><?xml version="1.0" encoding="utf-8"?>
+<p:sld xmlns:a="http://schemas.openxmlformats.org/drawingml/2006/main" xmlns:r="http://schemas.openxmlformats.org/officeDocument/2006/relationships" xmlns:p="http://schemas.openxmlformats.org/presentationml/2006/main">
+  <p:cSld>
+    <p:spTree>
+      <p:nvGrpSpPr>
+        <p:cNvPr id="1" name=""/>
+        <p:cNvGrpSpPr/>
+        <p:nvPr/>
+      </p:nvGrpSpPr>
+      <p:grpSpPr>
+        <a:xfrm>
+          <a:off x="0" y="0"/>
+          <a:ext cx="0" cy="0"/>
+          <a:chOff x="0" y="0"/>
+          <a:chExt cx="0" cy="0"/>
+        </a:xfrm>
+      </p:grpSpPr>
+      <p:sp>
+        <p:nvSpPr>
+          <p:cNvPr id="2" name="Title 1">
+            <a:extLst>
+              <a:ext uri="{FF2B5EF4-FFF2-40B4-BE49-F238E27FC236}">
+                <a16:creationId xmlns:a16="http://schemas.microsoft.com/office/drawing/2014/main" id="{897D8E5E-9252-4150-97C4-51C3C2C38837}"/>
+              </a:ext>
+            </a:extLst>
+          </p:cNvPr>
+          <p:cNvSpPr>
+            <a:spLocks noGrp="1"/>
+          </p:cNvSpPr>
+          <p:nvPr>
+            <p:ph type="title"/>
+          </p:nvPr>
+        </p:nvSpPr>
+        <p:spPr>
+          <a:xfrm>
+            <a:off x="0" y="2729553"/>
+            <a:ext cx="12192000" cy="1589626"/>
+          </a:xfrm>
+        </p:spPr>
+        <p:txBody>
+          <a:bodyPr>
+            <a:normAutofit/>
+          </a:bodyPr>
+          <a:lstStyle/>
+          <a:p>
+            <a:pPr algn="ctr"/>
+            <a:r>
+              <a:rPr lang="en-US" b="1" dirty="0">
+                <a:solidFill>
+                  <a:srgbClr val="FF0000"/>
+                </a:solidFill>
+                <a:latin typeface="+mn-lt"/>
+              </a:rPr>
+              <a:t>BACK TO THE START!</a:t>
+            </a:r>
+          </a:p>
+        </p:txBody>
+      </p:sp>
+    </p:spTree>
+    <p:extLst>
+      <p:ext uri="{BB962C8B-B14F-4D97-AF65-F5344CB8AC3E}">
+        <p14:creationId xmlns:p14="http://schemas.microsoft.com/office/powerpoint/2010/main" val="3627340074"/>
       </p:ext>
     </p:extLst>
   </p:cSld>

</xml_diff>